<commit_message>
Review and change of all documentation
Review and change of all documentation
</commit_message>
<xml_diff>
--- a/00-PRESENTATION/PRESENTACION_SOE.pptx
+++ b/00-PRESENTATION/PRESENTACION_SOE.pptx
@@ -292,10 +292,47 @@
       </p15:sldGuideLst>
     </p:ext>
     <p:ext uri="http://customooxmlschemas.google.com/">
-      <go:slidesCustomData xmlns:go="http://customooxmlschemas.google.com/" xmlns:ahyp="http://schemas.microsoft.com/office/drawing/2018/hyperlinkcolor" xmlns:p15="http://schemas.microsoft.com/office/powerpoint/2012/main" xmlns:p14="http://schemas.microsoft.com/office/powerpoint/2010/main" xmlns:com="http://schemas.openxmlformats.org/drawingml/2006/compatibility" xmlns:pvml="urn:schemas-microsoft-com:office:powerpoint" xmlns:v="urn:schemas-microsoft-com:vml" xmlns:o="urn:schemas-microsoft-com:office:office" xmlns:dgm="http://schemas.openxmlformats.org/drawingml/2006/diagram" xmlns:c="http://schemas.openxmlformats.org/drawingml/2006/chart" xmlns:mv="urn:schemas-microsoft-com:mac:vml" xmlns:mc="http://schemas.openxmlformats.org/markup-compatibility/2006" xmlns="" r:id="rId28" roundtripDataSignature="AMtx7miRF9QqgmOwsJlqFQYq63u9Ef2Mug=="/>
+      <go:slidesCustomData xmlns="" xmlns:mc="http://schemas.openxmlformats.org/markup-compatibility/2006" xmlns:mv="urn:schemas-microsoft-com:mac:vml" xmlns:c="http://schemas.openxmlformats.org/drawingml/2006/chart" xmlns:dgm="http://schemas.openxmlformats.org/drawingml/2006/diagram" xmlns:o="urn:schemas-microsoft-com:office:office" xmlns:v="urn:schemas-microsoft-com:vml" xmlns:pvml="urn:schemas-microsoft-com:office:powerpoint" xmlns:com="http://schemas.openxmlformats.org/drawingml/2006/compatibility" xmlns:p14="http://schemas.microsoft.com/office/powerpoint/2010/main" xmlns:p15="http://schemas.microsoft.com/office/powerpoint/2012/main" xmlns:ahyp="http://schemas.microsoft.com/office/drawing/2018/hyperlinkcolor" xmlns:go="http://customooxmlschemas.google.com/" r:id="rId28" roundtripDataSignature="AMtx7miRF9QqgmOwsJlqFQYq63u9Ef2Mug=="/>
     </p:ext>
   </p:extLst>
 </p:presentation>
+</file>
+
+<file path=ppt/changesInfos/changesInfo1.xml><?xml version="1.0" encoding="utf-8"?>
+<pc:chgInfo xmlns:a="http://schemas.openxmlformats.org/drawingml/2006/main" xmlns:r="http://schemas.openxmlformats.org/officeDocument/2006/relationships" xmlns:ac="http://schemas.microsoft.com/office/drawing/2013/main/command" xmlns:pc="http://schemas.microsoft.com/office/powerpoint/2013/main/command">
+  <pc:docChgLst>
+    <pc:chgData name="juan david mercado torres" userId="4c7f5dae58cac8d6" providerId="LiveId" clId="{999EF266-D90E-4F79-8DFE-E92D2742C72F}"/>
+    <pc:docChg chg="modSld">
+      <pc:chgData name="juan david mercado torres" userId="4c7f5dae58cac8d6" providerId="LiveId" clId="{999EF266-D90E-4F79-8DFE-E92D2742C72F}" dt="2022-03-22T15:59:17.762" v="1" actId="1076"/>
+      <pc:docMkLst>
+        <pc:docMk/>
+      </pc:docMkLst>
+      <pc:sldChg chg="modSp mod">
+        <pc:chgData name="juan david mercado torres" userId="4c7f5dae58cac8d6" providerId="LiveId" clId="{999EF266-D90E-4F79-8DFE-E92D2742C72F}" dt="2022-03-22T15:59:17.762" v="1" actId="1076"/>
+        <pc:sldMkLst>
+          <pc:docMk/>
+          <pc:sldMk cId="0" sldId="257"/>
+        </pc:sldMkLst>
+        <pc:spChg chg="mod">
+          <ac:chgData name="juan david mercado torres" userId="4c7f5dae58cac8d6" providerId="LiveId" clId="{999EF266-D90E-4F79-8DFE-E92D2742C72F}" dt="2022-03-22T15:59:17.762" v="1" actId="1076"/>
+          <ac:spMkLst>
+            <pc:docMk/>
+            <pc:sldMk cId="0" sldId="257"/>
+            <ac:spMk id="67" creationId="{00000000-0000-0000-0000-000000000000}"/>
+          </ac:spMkLst>
+        </pc:spChg>
+        <pc:spChg chg="mod">
+          <ac:chgData name="juan david mercado torres" userId="4c7f5dae58cac8d6" providerId="LiveId" clId="{999EF266-D90E-4F79-8DFE-E92D2742C72F}" dt="2022-03-22T15:58:58.980" v="0" actId="20577"/>
+          <ac:spMkLst>
+            <pc:docMk/>
+            <pc:sldMk cId="0" sldId="257"/>
+            <ac:spMk id="69" creationId="{00000000-0000-0000-0000-000000000000}"/>
+          </ac:spMkLst>
+        </pc:spChg>
+      </pc:sldChg>
+    </pc:docChg>
+  </pc:docChgLst>
+</pc:chgInfo>
 </file>
 
 <file path=ppt/notesMasters/notesMaster1.xml><?xml version="1.0" encoding="utf-8"?>
@@ -14821,7 +14858,7 @@
         </p:nvSpPr>
         <p:spPr>
           <a:xfrm>
-            <a:off x="3852375" y="4240900"/>
+            <a:off x="3852375" y="6618775"/>
             <a:ext cx="18098100" cy="3302100"/>
           </a:xfrm>
           <a:prstGeom prst="rect">
@@ -14855,7 +14892,7 @@
               <a:buFont typeface="Calibri"/>
               <a:buNone/>
             </a:pPr>
-            <a:endParaRPr/>
+            <a:endParaRPr dirty="0"/>
           </a:p>
           <a:p>
             <a:pPr marL="0" marR="36573" lvl="0" indent="0" algn="ctr" rtl="0">
@@ -14876,7 +14913,7 @@
               <a:buNone/>
             </a:pPr>
             <a:r>
-              <a:rPr lang="en-US" sz="7760" b="1">
+              <a:rPr lang="en-US" sz="7760" b="1" dirty="0" err="1">
                 <a:solidFill>
                   <a:srgbClr val="434343"/>
                 </a:solidFill>
@@ -14885,10 +14922,10 @@
                 <a:cs typeface="Calibri"/>
                 <a:sym typeface="Calibri"/>
               </a:rPr>
-              <a:t>Integrantes:</a:t>
-            </a:r>
-            <a:br>
-              <a:rPr lang="en-US" sz="7760" b="1">
+              <a:t>Integrantes</a:t>
+            </a:r>
+            <a:r>
+              <a:rPr lang="en-US" sz="7760" b="1" dirty="0">
                 <a:solidFill>
                   <a:srgbClr val="434343"/>
                 </a:solidFill>
@@ -14897,9 +14934,10 @@
                 <a:cs typeface="Calibri"/>
                 <a:sym typeface="Calibri"/>
               </a:rPr>
-            </a:br>
-            <a:r>
-              <a:rPr lang="en-US" sz="7200" b="1">
+              <a:t>:</a:t>
+            </a:r>
+            <a:br>
+              <a:rPr lang="en-US" sz="7760" b="1" dirty="0">
                 <a:solidFill>
                   <a:srgbClr val="434343"/>
                 </a:solidFill>
@@ -14908,10 +14946,9 @@
                 <a:cs typeface="Calibri"/>
                 <a:sym typeface="Calibri"/>
               </a:rPr>
-              <a:t>Juan Camilo Rojas Rojas</a:t>
-            </a:r>
-            <a:br>
-              <a:rPr lang="en-US" sz="7200" b="1">
+            </a:br>
+            <a:r>
+              <a:rPr lang="en-US" sz="7200" b="1" dirty="0">
                 <a:solidFill>
                   <a:srgbClr val="434343"/>
                 </a:solidFill>
@@ -14920,9 +14957,10 @@
                 <a:cs typeface="Calibri"/>
                 <a:sym typeface="Calibri"/>
               </a:rPr>
-            </a:br>
-            <a:r>
-              <a:rPr lang="en-US" sz="7200" b="1">
+              <a:t>Juan Camilo Rojas </a:t>
+            </a:r>
+            <a:r>
+              <a:rPr lang="en-US" sz="7200" b="1" dirty="0" err="1">
                 <a:solidFill>
                   <a:srgbClr val="434343"/>
                 </a:solidFill>
@@ -14931,10 +14969,10 @@
                 <a:cs typeface="Calibri"/>
                 <a:sym typeface="Calibri"/>
               </a:rPr>
-              <a:t>Justin Jarnol Garzón Cardenas</a:t>
+              <a:t>Rojas</a:t>
             </a:r>
             <a:br>
-              <a:rPr lang="en-US" sz="7200" b="1">
+              <a:rPr lang="en-US" sz="7200" b="1" dirty="0">
                 <a:solidFill>
                   <a:srgbClr val="434343"/>
                 </a:solidFill>
@@ -14945,7 +14983,7 @@
               </a:rPr>
             </a:br>
             <a:r>
-              <a:rPr lang="en-US" sz="7200" b="1">
+              <a:rPr lang="en-US" sz="7200" b="1" dirty="0">
                 <a:solidFill>
                   <a:srgbClr val="434343"/>
                 </a:solidFill>
@@ -14954,10 +14992,10 @@
                 <a:cs typeface="Calibri"/>
                 <a:sym typeface="Calibri"/>
               </a:rPr>
-              <a:t>Jairo Styp Rodriguez Patiño</a:t>
-            </a:r>
-            <a:br>
-              <a:rPr lang="en-US" sz="7200" b="1">
+              <a:t>Justin </a:t>
+            </a:r>
+            <a:r>
+              <a:rPr lang="en-US" sz="7200" b="1" dirty="0" err="1">
                 <a:solidFill>
                   <a:srgbClr val="434343"/>
                 </a:solidFill>
@@ -14966,9 +15004,10 @@
                 <a:cs typeface="Calibri"/>
                 <a:sym typeface="Calibri"/>
               </a:rPr>
-            </a:br>
-            <a:r>
-              <a:rPr lang="en-US" sz="7200" b="1">
+              <a:t>Jarnol</a:t>
+            </a:r>
+            <a:r>
+              <a:rPr lang="en-US" sz="7200" b="1" dirty="0">
                 <a:solidFill>
                   <a:srgbClr val="434343"/>
                 </a:solidFill>
@@ -14977,9 +15016,91 @@
                 <a:cs typeface="Calibri"/>
                 <a:sym typeface="Calibri"/>
               </a:rPr>
+              <a:t> Garzón Cardenas</a:t>
+            </a:r>
+            <a:br>
+              <a:rPr lang="en-US" sz="7200" b="1" dirty="0">
+                <a:solidFill>
+                  <a:srgbClr val="434343"/>
+                </a:solidFill>
+                <a:latin typeface="Calibri"/>
+                <a:ea typeface="Calibri"/>
+                <a:cs typeface="Calibri"/>
+                <a:sym typeface="Calibri"/>
+              </a:rPr>
+            </a:br>
+            <a:r>
+              <a:rPr lang="en-US" sz="7200" b="1" dirty="0">
+                <a:solidFill>
+                  <a:srgbClr val="434343"/>
+                </a:solidFill>
+                <a:latin typeface="Calibri"/>
+                <a:ea typeface="Calibri"/>
+                <a:cs typeface="Calibri"/>
+                <a:sym typeface="Calibri"/>
+              </a:rPr>
+              <a:t>Jairo </a:t>
+            </a:r>
+            <a:r>
+              <a:rPr lang="en-US" sz="7200" b="1" dirty="0" err="1">
+                <a:solidFill>
+                  <a:srgbClr val="434343"/>
+                </a:solidFill>
+                <a:latin typeface="Calibri"/>
+                <a:ea typeface="Calibri"/>
+                <a:cs typeface="Calibri"/>
+                <a:sym typeface="Calibri"/>
+              </a:rPr>
+              <a:t>Styp</a:t>
+            </a:r>
+            <a:r>
+              <a:rPr lang="en-US" sz="7200" b="1" dirty="0">
+                <a:solidFill>
+                  <a:srgbClr val="434343"/>
+                </a:solidFill>
+                <a:latin typeface="Calibri"/>
+                <a:ea typeface="Calibri"/>
+                <a:cs typeface="Calibri"/>
+                <a:sym typeface="Calibri"/>
+              </a:rPr>
+              <a:t> Rodriguez </a:t>
+            </a:r>
+            <a:r>
+              <a:rPr lang="en-US" sz="7200" b="1" dirty="0" err="1">
+                <a:solidFill>
+                  <a:srgbClr val="434343"/>
+                </a:solidFill>
+                <a:latin typeface="Calibri"/>
+                <a:ea typeface="Calibri"/>
+                <a:cs typeface="Calibri"/>
+                <a:sym typeface="Calibri"/>
+              </a:rPr>
+              <a:t>Patiño</a:t>
+            </a:r>
+            <a:br>
+              <a:rPr lang="en-US" sz="7200" b="1" dirty="0">
+                <a:solidFill>
+                  <a:srgbClr val="434343"/>
+                </a:solidFill>
+                <a:latin typeface="Calibri"/>
+                <a:ea typeface="Calibri"/>
+                <a:cs typeface="Calibri"/>
+                <a:sym typeface="Calibri"/>
+              </a:rPr>
+            </a:br>
+            <a:r>
+              <a:rPr lang="en-US" sz="7200" b="1" dirty="0">
+                <a:solidFill>
+                  <a:srgbClr val="434343"/>
+                </a:solidFill>
+                <a:latin typeface="Calibri"/>
+                <a:ea typeface="Calibri"/>
+                <a:cs typeface="Calibri"/>
+                <a:sym typeface="Calibri"/>
+              </a:rPr>
               <a:t>Juan David Mercado Torres</a:t>
             </a:r>
-            <a:endParaRPr sz="7200" b="0" i="0" u="none" strike="noStrike" cap="none">
+            <a:endParaRPr sz="7200" b="0" i="0" u="none" strike="noStrike" cap="none" dirty="0">
               <a:solidFill>
                 <a:srgbClr val="000000"/>
               </a:solidFill>
@@ -15081,41 +15202,6 @@
               <a:buFont typeface="Arial"/>
               <a:buNone/>
             </a:pPr>
-            <a:r>
-              <a:rPr lang="en-US" sz="7200" b="1" dirty="0">
-                <a:solidFill>
-                  <a:srgbClr val="434343"/>
-                </a:solidFill>
-                <a:latin typeface="Calibri"/>
-                <a:ea typeface="Calibri"/>
-                <a:cs typeface="Calibri"/>
-                <a:sym typeface="Calibri"/>
-              </a:rPr>
-              <a:t>Instructor:</a:t>
-            </a:r>
-            <a:br>
-              <a:rPr lang="en-US" sz="7200" b="1" dirty="0">
-                <a:solidFill>
-                  <a:srgbClr val="434343"/>
-                </a:solidFill>
-                <a:latin typeface="Calibri"/>
-                <a:ea typeface="Calibri"/>
-                <a:cs typeface="Calibri"/>
-                <a:sym typeface="Calibri"/>
-              </a:rPr>
-            </a:br>
-            <a:r>
-              <a:rPr lang="en-US" sz="7200" b="1" dirty="0">
-                <a:solidFill>
-                  <a:srgbClr val="434343"/>
-                </a:solidFill>
-                <a:latin typeface="Calibri"/>
-                <a:ea typeface="Calibri"/>
-                <a:cs typeface="Calibri"/>
-                <a:sym typeface="Calibri"/>
-              </a:rPr>
-              <a:t>RICARDO AUGUSTO CASTELBLANCO SEPULVEDA</a:t>
-            </a:r>
             <a:endParaRPr sz="7200" b="0" i="0" u="none" strike="noStrike" cap="none" dirty="0">
               <a:solidFill>
                 <a:srgbClr val="434343"/>

</xml_diff>